<commit_message>
session1 presentation file updated
</commit_message>
<xml_diff>
--- a/session1/presentation/Basic's of Sigle Board Computer.pptx
+++ b/session1/presentation/Basic's of Sigle Board Computer.pptx
@@ -257,7 +257,7 @@
           <a:p>
             <a:fld id="{1139FA4A-C808-4981-8BA9-64217A6CCEA7}" type="datetimeFigureOut">
               <a:rPr lang="en-US" smtClean="0"/>
-              <a:t>6/21/2017</a:t>
+              <a:t>2/2/2018</a:t>
             </a:fld>
             <a:endParaRPr lang="en-US"/>
           </a:p>
@@ -425,7 +425,7 @@
           <a:p>
             <a:fld id="{1139FA4A-C808-4981-8BA9-64217A6CCEA7}" type="datetimeFigureOut">
               <a:rPr lang="en-US" smtClean="0"/>
-              <a:t>6/21/2017</a:t>
+              <a:t>2/2/2018</a:t>
             </a:fld>
             <a:endParaRPr lang="en-US"/>
           </a:p>
@@ -603,7 +603,7 @@
           <a:p>
             <a:fld id="{1139FA4A-C808-4981-8BA9-64217A6CCEA7}" type="datetimeFigureOut">
               <a:rPr lang="en-US" smtClean="0"/>
-              <a:t>6/21/2017</a:t>
+              <a:t>2/2/2018</a:t>
             </a:fld>
             <a:endParaRPr lang="en-US"/>
           </a:p>
@@ -771,7 +771,7 @@
           <a:p>
             <a:fld id="{1139FA4A-C808-4981-8BA9-64217A6CCEA7}" type="datetimeFigureOut">
               <a:rPr lang="en-US" smtClean="0"/>
-              <a:t>6/21/2017</a:t>
+              <a:t>2/2/2018</a:t>
             </a:fld>
             <a:endParaRPr lang="en-US"/>
           </a:p>
@@ -1016,7 +1016,7 @@
           <a:p>
             <a:fld id="{1139FA4A-C808-4981-8BA9-64217A6CCEA7}" type="datetimeFigureOut">
               <a:rPr lang="en-US" smtClean="0"/>
-              <a:t>6/21/2017</a:t>
+              <a:t>2/2/2018</a:t>
             </a:fld>
             <a:endParaRPr lang="en-US"/>
           </a:p>
@@ -1245,7 +1245,7 @@
           <a:p>
             <a:fld id="{1139FA4A-C808-4981-8BA9-64217A6CCEA7}" type="datetimeFigureOut">
               <a:rPr lang="en-US" smtClean="0"/>
-              <a:t>6/21/2017</a:t>
+              <a:t>2/2/2018</a:t>
             </a:fld>
             <a:endParaRPr lang="en-US"/>
           </a:p>
@@ -1609,7 +1609,7 @@
           <a:p>
             <a:fld id="{1139FA4A-C808-4981-8BA9-64217A6CCEA7}" type="datetimeFigureOut">
               <a:rPr lang="en-US" smtClean="0"/>
-              <a:t>6/21/2017</a:t>
+              <a:t>2/2/2018</a:t>
             </a:fld>
             <a:endParaRPr lang="en-US"/>
           </a:p>
@@ -1726,7 +1726,7 @@
           <a:p>
             <a:fld id="{1139FA4A-C808-4981-8BA9-64217A6CCEA7}" type="datetimeFigureOut">
               <a:rPr lang="en-US" smtClean="0"/>
-              <a:t>6/21/2017</a:t>
+              <a:t>2/2/2018</a:t>
             </a:fld>
             <a:endParaRPr lang="en-US"/>
           </a:p>
@@ -1821,7 +1821,7 @@
           <a:p>
             <a:fld id="{1139FA4A-C808-4981-8BA9-64217A6CCEA7}" type="datetimeFigureOut">
               <a:rPr lang="en-US" smtClean="0"/>
-              <a:t>6/21/2017</a:t>
+              <a:t>2/2/2018</a:t>
             </a:fld>
             <a:endParaRPr lang="en-US"/>
           </a:p>
@@ -2096,7 +2096,7 @@
           <a:p>
             <a:fld id="{1139FA4A-C808-4981-8BA9-64217A6CCEA7}" type="datetimeFigureOut">
               <a:rPr lang="en-US" smtClean="0"/>
-              <a:t>6/21/2017</a:t>
+              <a:t>2/2/2018</a:t>
             </a:fld>
             <a:endParaRPr lang="en-US"/>
           </a:p>
@@ -2348,7 +2348,7 @@
           <a:p>
             <a:fld id="{1139FA4A-C808-4981-8BA9-64217A6CCEA7}" type="datetimeFigureOut">
               <a:rPr lang="en-US" smtClean="0"/>
-              <a:t>6/21/2017</a:t>
+              <a:t>2/2/2018</a:t>
             </a:fld>
             <a:endParaRPr lang="en-US"/>
           </a:p>
@@ -2559,7 +2559,7 @@
           <a:p>
             <a:fld id="{1139FA4A-C808-4981-8BA9-64217A6CCEA7}" type="datetimeFigureOut">
               <a:rPr lang="en-US" smtClean="0"/>
-              <a:t>6/21/2017</a:t>
+              <a:t>2/2/2018</a:t>
             </a:fld>
             <a:endParaRPr lang="en-US"/>
           </a:p>
@@ -7328,7 +7328,7 @@
         </p:blipFill>
         <p:spPr>
           <a:xfrm>
-            <a:off x="206177" y="1674667"/>
+            <a:off x="281665" y="1692119"/>
             <a:ext cx="3803961" cy="1610142"/>
           </a:xfrm>
           <a:prstGeom prst="rect">
@@ -7358,7 +7358,7 @@
         </p:blipFill>
         <p:spPr>
           <a:xfrm flipV="1">
-            <a:off x="4207546" y="1674667"/>
+            <a:off x="4941920" y="1692119"/>
             <a:ext cx="1207806" cy="1357801"/>
           </a:xfrm>
           <a:prstGeom prst="rect">
@@ -7388,7 +7388,7 @@
         </p:blipFill>
         <p:spPr>
           <a:xfrm>
-            <a:off x="6188304" y="1719875"/>
+            <a:off x="7420719" y="1737326"/>
             <a:ext cx="1267386" cy="1267386"/>
           </a:xfrm>
           <a:prstGeom prst="rect">
@@ -7417,38 +7417,8 @@
         </p:blipFill>
         <p:spPr>
           <a:xfrm>
-            <a:off x="8195383" y="1225099"/>
+            <a:off x="10063371" y="1209507"/>
             <a:ext cx="1253413" cy="1840413"/>
-          </a:xfrm>
-          <a:prstGeom prst="rect">
-            <a:avLst/>
-          </a:prstGeom>
-        </p:spPr>
-      </p:pic>
-      <p:pic>
-        <p:nvPicPr>
-          <p:cNvPr id="8" name="Picture 7"/>
-          <p:cNvPicPr>
-            <a:picLocks noChangeAspect="1"/>
-          </p:cNvPicPr>
-          <p:nvPr/>
-        </p:nvPicPr>
-        <p:blipFill>
-          <a:blip r:embed="rId6" cstate="print">
-            <a:extLst>
-              <a:ext uri="{28A0092B-C50C-407E-A947-70E740481C1C}">
-                <a14:useLocalDpi xmlns:a14="http://schemas.microsoft.com/office/drawing/2010/main" val="0"/>
-              </a:ext>
-            </a:extLst>
-          </a:blip>
-          <a:stretch>
-            <a:fillRect/>
-          </a:stretch>
-        </p:blipFill>
-        <p:spPr>
-          <a:xfrm>
-            <a:off x="9987797" y="1225099"/>
-            <a:ext cx="1820149" cy="2143191"/>
           </a:xfrm>
           <a:prstGeom prst="rect">
             <a:avLst/>

</xml_diff>